<commit_message>
Added more organized abstraction and icon
Windows only!
</commit_message>
<xml_diff>
--- a/OriNoco/OriNocoDesignSheet.pptx
+++ b/OriNoco/OriNocoDesignSheet.pptx
@@ -263,7 +263,7 @@
           <a:p>
             <a:fld id="{15BE0549-D341-4617-ABE1-70A24E419FFB}" type="datetimeFigureOut">
               <a:rPr lang="en-US" smtClean="0"/>
-              <a:t>7/12/2024</a:t>
+              <a:t>7/13/2024</a:t>
             </a:fld>
             <a:endParaRPr lang="en-US"/>
           </a:p>
@@ -461,7 +461,7 @@
           <a:p>
             <a:fld id="{15BE0549-D341-4617-ABE1-70A24E419FFB}" type="datetimeFigureOut">
               <a:rPr lang="en-US" smtClean="0"/>
-              <a:t>7/12/2024</a:t>
+              <a:t>7/13/2024</a:t>
             </a:fld>
             <a:endParaRPr lang="en-US"/>
           </a:p>
@@ -669,7 +669,7 @@
           <a:p>
             <a:fld id="{15BE0549-D341-4617-ABE1-70A24E419FFB}" type="datetimeFigureOut">
               <a:rPr lang="en-US" smtClean="0"/>
-              <a:t>7/12/2024</a:t>
+              <a:t>7/13/2024</a:t>
             </a:fld>
             <a:endParaRPr lang="en-US"/>
           </a:p>
@@ -867,7 +867,7 @@
           <a:p>
             <a:fld id="{15BE0549-D341-4617-ABE1-70A24E419FFB}" type="datetimeFigureOut">
               <a:rPr lang="en-US" smtClean="0"/>
-              <a:t>7/12/2024</a:t>
+              <a:t>7/13/2024</a:t>
             </a:fld>
             <a:endParaRPr lang="en-US"/>
           </a:p>
@@ -1142,7 +1142,7 @@
           <a:p>
             <a:fld id="{15BE0549-D341-4617-ABE1-70A24E419FFB}" type="datetimeFigureOut">
               <a:rPr lang="en-US" smtClean="0"/>
-              <a:t>7/12/2024</a:t>
+              <a:t>7/13/2024</a:t>
             </a:fld>
             <a:endParaRPr lang="en-US"/>
           </a:p>
@@ -1407,7 +1407,7 @@
           <a:p>
             <a:fld id="{15BE0549-D341-4617-ABE1-70A24E419FFB}" type="datetimeFigureOut">
               <a:rPr lang="en-US" smtClean="0"/>
-              <a:t>7/12/2024</a:t>
+              <a:t>7/13/2024</a:t>
             </a:fld>
             <a:endParaRPr lang="en-US"/>
           </a:p>
@@ -1819,7 +1819,7 @@
           <a:p>
             <a:fld id="{15BE0549-D341-4617-ABE1-70A24E419FFB}" type="datetimeFigureOut">
               <a:rPr lang="en-US" smtClean="0"/>
-              <a:t>7/12/2024</a:t>
+              <a:t>7/13/2024</a:t>
             </a:fld>
             <a:endParaRPr lang="en-US"/>
           </a:p>
@@ -1960,7 +1960,7 @@
           <a:p>
             <a:fld id="{15BE0549-D341-4617-ABE1-70A24E419FFB}" type="datetimeFigureOut">
               <a:rPr lang="en-US" smtClean="0"/>
-              <a:t>7/12/2024</a:t>
+              <a:t>7/13/2024</a:t>
             </a:fld>
             <a:endParaRPr lang="en-US"/>
           </a:p>
@@ -2073,7 +2073,7 @@
           <a:p>
             <a:fld id="{15BE0549-D341-4617-ABE1-70A24E419FFB}" type="datetimeFigureOut">
               <a:rPr lang="en-US" smtClean="0"/>
-              <a:t>7/12/2024</a:t>
+              <a:t>7/13/2024</a:t>
             </a:fld>
             <a:endParaRPr lang="en-US"/>
           </a:p>
@@ -2384,7 +2384,7 @@
           <a:p>
             <a:fld id="{15BE0549-D341-4617-ABE1-70A24E419FFB}" type="datetimeFigureOut">
               <a:rPr lang="en-US" smtClean="0"/>
-              <a:t>7/12/2024</a:t>
+              <a:t>7/13/2024</a:t>
             </a:fld>
             <a:endParaRPr lang="en-US"/>
           </a:p>
@@ -2672,7 +2672,7 @@
           <a:p>
             <a:fld id="{15BE0549-D341-4617-ABE1-70A24E419FFB}" type="datetimeFigureOut">
               <a:rPr lang="en-US" smtClean="0"/>
-              <a:t>7/12/2024</a:t>
+              <a:t>7/13/2024</a:t>
             </a:fld>
             <a:endParaRPr lang="en-US"/>
           </a:p>
@@ -2919,7 +2919,7 @@
           <a:p>
             <a:fld id="{15BE0549-D341-4617-ABE1-70A24E419FFB}" type="datetimeFigureOut">
               <a:rPr lang="en-US" smtClean="0"/>
-              <a:t>7/12/2024</a:t>
+              <a:t>7/13/2024</a:t>
             </a:fld>
             <a:endParaRPr lang="en-US"/>
           </a:p>
@@ -3350,7 +3350,7 @@
         </p:nvSpPr>
         <p:spPr>
           <a:xfrm>
-            <a:off x="3092612" y="2810317"/>
+            <a:off x="3092614" y="3496117"/>
             <a:ext cx="6006773" cy="923330"/>
           </a:xfrm>
           <a:prstGeom prst="rect">
@@ -3405,7 +3405,7 @@
         </p:nvSpPr>
         <p:spPr>
           <a:xfrm>
-            <a:off x="4883968" y="3803226"/>
+            <a:off x="4883970" y="4489026"/>
             <a:ext cx="2424061" cy="338554"/>
           </a:xfrm>
           <a:prstGeom prst="rect">
@@ -3446,6 +3446,78 @@
           </a:p>
         </p:txBody>
       </p:sp>
+      <p:pic>
+        <p:nvPicPr>
+          <p:cNvPr id="3" name="Picture 2">
+            <a:extLst>
+              <a:ext uri="{FF2B5EF4-FFF2-40B4-BE49-F238E27FC236}">
+                <a16:creationId xmlns:a16="http://schemas.microsoft.com/office/drawing/2014/main" id="{4EC36E93-6351-4628-96C4-5E3541FF8C33}"/>
+              </a:ext>
+            </a:extLst>
+          </p:cNvPr>
+          <p:cNvPicPr>
+            <a:picLocks noChangeAspect="1"/>
+          </p:cNvPicPr>
+          <p:nvPr/>
+        </p:nvPicPr>
+        <p:blipFill>
+          <a:blip r:embed="rId2">
+            <a:extLst>
+              <a:ext uri="{28A0092B-C50C-407E-A947-70E740481C1C}">
+                <a14:useLocalDpi xmlns:a14="http://schemas.microsoft.com/office/drawing/2010/main" val="0"/>
+              </a:ext>
+            </a:extLst>
+          </a:blip>
+          <a:stretch>
+            <a:fillRect/>
+          </a:stretch>
+        </p:blipFill>
+        <p:spPr>
+          <a:xfrm>
+            <a:off x="5181714" y="1524114"/>
+            <a:ext cx="1828571" cy="1828571"/>
+          </a:xfrm>
+          <a:prstGeom prst="rect">
+            <a:avLst/>
+          </a:prstGeom>
+        </p:spPr>
+      </p:pic>
+      <p:pic>
+        <p:nvPicPr>
+          <p:cNvPr id="7" name="Picture 6">
+            <a:extLst>
+              <a:ext uri="{FF2B5EF4-FFF2-40B4-BE49-F238E27FC236}">
+                <a16:creationId xmlns:a16="http://schemas.microsoft.com/office/drawing/2014/main" id="{15A0F973-FC47-49A3-BE9D-6E6E541D351B}"/>
+              </a:ext>
+            </a:extLst>
+          </p:cNvPr>
+          <p:cNvPicPr>
+            <a:picLocks noChangeAspect="1"/>
+          </p:cNvPicPr>
+          <p:nvPr/>
+        </p:nvPicPr>
+        <p:blipFill>
+          <a:blip r:embed="rId3">
+            <a:extLst>
+              <a:ext uri="{28A0092B-C50C-407E-A947-70E740481C1C}">
+                <a14:useLocalDpi xmlns:a14="http://schemas.microsoft.com/office/drawing/2010/main" val="0"/>
+              </a:ext>
+            </a:extLst>
+          </a:blip>
+          <a:stretch>
+            <a:fillRect/>
+          </a:stretch>
+        </p:blipFill>
+        <p:spPr>
+          <a:xfrm>
+            <a:off x="5662408" y="1828800"/>
+            <a:ext cx="867184" cy="1164165"/>
+          </a:xfrm>
+          <a:prstGeom prst="rect">
+            <a:avLst/>
+          </a:prstGeom>
+        </p:spPr>
+      </p:pic>
     </p:spTree>
     <p:extLst>
       <p:ext uri="{BB962C8B-B14F-4D97-AF65-F5344CB8AC3E}">

</xml_diff>